<commit_message>
Gantt chart updated & saved as pptx + pdf files
</commit_message>
<xml_diff>
--- a/Gantt_chart_Msc_Bioinf.pptx
+++ b/Gantt_chart_Msc_Bioinf.pptx
@@ -5735,6 +5735,67 @@
           </a:p>
         </p:txBody>
       </p:sp>
+      <p:sp>
+        <p:nvSpPr>
+          <p:cNvPr id="14" name="TextBox 13">
+            <a:extLst>
+              <a:ext uri="{FF2B5EF4-FFF2-40B4-BE49-F238E27FC236}">
+                <a16:creationId xmlns:a16="http://schemas.microsoft.com/office/drawing/2014/main" id="{CDF9542C-C24A-401E-8EFE-D80C0A7F0607}"/>
+              </a:ext>
+            </a:extLst>
+          </p:cNvPr>
+          <p:cNvSpPr txBox="1"/>
+          <p:nvPr/>
+        </p:nvSpPr>
+        <p:spPr>
+          <a:xfrm>
+            <a:off x="4190544" y="1549400"/>
+            <a:ext cx="4735142" cy="400110"/>
+          </a:xfrm>
+          <a:prstGeom prst="rect">
+            <a:avLst/>
+          </a:prstGeom>
+          <a:noFill/>
+        </p:spPr>
+        <p:txBody>
+          <a:bodyPr wrap="none" rtlCol="0">
+            <a:spAutoFit/>
+          </a:bodyPr>
+          <a:lstStyle/>
+          <a:p>
+            <a:pPr algn="ctr"/>
+            <a:r>
+              <a:rPr lang="de-DE" sz="2000" b="1" dirty="0" err="1"/>
+              <a:t>MSc</a:t>
+            </a:r>
+            <a:r>
+              <a:rPr lang="de-DE" sz="2000" b="1" dirty="0"/>
+              <a:t> Research Project - Plan </a:t>
+            </a:r>
+            <a:r>
+              <a:rPr lang="de-DE" sz="2000" b="1" dirty="0" err="1"/>
+              <a:t>for</a:t>
+            </a:r>
+            <a:r>
+              <a:rPr lang="de-DE" sz="2000" b="1" dirty="0"/>
+              <a:t> </a:t>
+            </a:r>
+            <a:r>
+              <a:rPr lang="de-DE" sz="2000" b="1" dirty="0" err="1"/>
+              <a:t>first</a:t>
+            </a:r>
+            <a:r>
+              <a:rPr lang="de-DE" sz="2000" b="1" dirty="0"/>
+              <a:t> </a:t>
+            </a:r>
+            <a:r>
+              <a:rPr lang="de-DE" sz="2000" b="1" dirty="0" err="1"/>
+              <a:t>month</a:t>
+            </a:r>
+            <a:endParaRPr lang="en-US" sz="2000" b="1" dirty="0"/>
+          </a:p>
+        </p:txBody>
+      </p:sp>
     </p:spTree>
     <p:custDataLst>
       <p:tags r:id="rId1"/>
@@ -6446,21 +6507,6 @@
 </file>
 
 <file path=customXml/item1.xml><?xml version="1.0" encoding="utf-8"?>
-<?mso-contentType ?>
-<FormTemplates xmlns="http://schemas.microsoft.com/sharepoint/v3/contenttype/forms">
-  <Display>DocumentLibraryForm</Display>
-  <Edit>DocumentLibraryForm</Edit>
-  <New>DocumentLibraryForm</New>
-</FormTemplates>
-</file>
-
-<file path=customXml/item2.xml><?xml version="1.0" encoding="utf-8"?>
-<p:properties xmlns:p="http://schemas.microsoft.com/office/2006/metadata/properties" xmlns:xsi="http://www.w3.org/2001/XMLSchema-instance" xmlns:pc="http://schemas.microsoft.com/office/infopath/2007/PartnerControls">
-  <documentManagement/>
-</p:properties>
-</file>
-
-<file path=customXml/item3.xml><?xml version="1.0" encoding="utf-8"?>
 <ct:contentTypeSchema xmlns:ct="http://schemas.microsoft.com/office/2006/metadata/contentType" xmlns:ma="http://schemas.microsoft.com/office/2006/metadata/properties/metaAttributes" ct:_="" ma:_="" ma:contentTypeName="Document" ma:contentTypeID="0x0101009F5D4579C79BA848862C07EA745A59DA" ma:contentTypeVersion="12" ma:contentTypeDescription="Create a new document." ma:contentTypeScope="" ma:versionID="561b97d3cd4e430cff1b017a8df43b50">
   <xsd:schema xmlns:xsd="http://www.w3.org/2001/XMLSchema" xmlns:xs="http://www.w3.org/2001/XMLSchema" xmlns:p="http://schemas.microsoft.com/office/2006/metadata/properties" xmlns:ns3="7a019f6c-b0e0-4e4c-a8bf-0404b70041b7" xmlns:ns4="3a44955a-9611-4e11-b394-5c7f996d2a5e" targetNamespace="http://schemas.microsoft.com/office/2006/metadata/properties" ma:root="true" ma:fieldsID="f385fe62994dfd7c4b5d8e86d7939601" ns3:_="" ns4:_="">
     <xsd:import namespace="7a019f6c-b0e0-4e4c-a8bf-0404b70041b7"/>
@@ -6677,32 +6723,22 @@
 </ct:contentTypeSchema>
 </file>
 
+<file path=customXml/item2.xml><?xml version="1.0" encoding="utf-8"?>
+<p:properties xmlns:p="http://schemas.microsoft.com/office/2006/metadata/properties" xmlns:xsi="http://www.w3.org/2001/XMLSchema-instance" xmlns:pc="http://schemas.microsoft.com/office/infopath/2007/PartnerControls">
+  <documentManagement/>
+</p:properties>
+</file>
+
+<file path=customXml/item3.xml><?xml version="1.0" encoding="utf-8"?>
+<?mso-contentType ?>
+<FormTemplates xmlns="http://schemas.microsoft.com/sharepoint/v3/contenttype/forms">
+  <Display>DocumentLibraryForm</Display>
+  <Edit>DocumentLibraryForm</Edit>
+  <New>DocumentLibraryForm</New>
+</FormTemplates>
+</file>
+
 <file path=customXml/itemProps1.xml><?xml version="1.0" encoding="utf-8"?>
-<ds:datastoreItem xmlns:ds="http://schemas.openxmlformats.org/officeDocument/2006/customXml" ds:itemID="{B9505F6C-6655-4394-A390-5D0FFB49AEA6}">
-  <ds:schemaRefs>
-    <ds:schemaRef ds:uri="http://schemas.microsoft.com/sharepoint/v3/contenttype/forms"/>
-  </ds:schemaRefs>
-</ds:datastoreItem>
-</file>
-
-<file path=customXml/itemProps2.xml><?xml version="1.0" encoding="utf-8"?>
-<ds:datastoreItem xmlns:ds="http://schemas.openxmlformats.org/officeDocument/2006/customXml" ds:itemID="{A75EC8C0-5113-4EFD-AE80-6BEE7563151B}">
-  <ds:schemaRefs>
-    <ds:schemaRef ds:uri="7a019f6c-b0e0-4e4c-a8bf-0404b70041b7"/>
-    <ds:schemaRef ds:uri="3a44955a-9611-4e11-b394-5c7f996d2a5e"/>
-    <ds:schemaRef ds:uri="http://schemas.microsoft.com/office/2006/metadata/properties"/>
-    <ds:schemaRef ds:uri="http://www.w3.org/XML/1998/namespace"/>
-    <ds:schemaRef ds:uri="http://schemas.microsoft.com/office/infopath/2007/PartnerControls"/>
-    <ds:schemaRef ds:uri="http://purl.org/dc/terms/"/>
-    <ds:schemaRef ds:uri="http://schemas.openxmlformats.org/package/2006/metadata/core-properties"/>
-    <ds:schemaRef ds:uri="http://schemas.microsoft.com/office/2006/documentManagement/types"/>
-    <ds:schemaRef ds:uri="http://purl.org/dc/dcmitype/"/>
-    <ds:schemaRef ds:uri="http://purl.org/dc/elements/1.1/"/>
-  </ds:schemaRefs>
-</ds:datastoreItem>
-</file>
-
-<file path=customXml/itemProps3.xml><?xml version="1.0" encoding="utf-8"?>
 <ds:datastoreItem xmlns:ds="http://schemas.openxmlformats.org/officeDocument/2006/customXml" ds:itemID="{155CF974-FFF5-49BF-A517-7EABF81AD041}">
   <ds:schemaRefs>
     <ds:schemaRef ds:uri="http://schemas.microsoft.com/office/2006/metadata/contentType"/>
@@ -6719,4 +6755,29 @@
     <ds:schemaRef ds:uri="http://schemas.microsoft.com/internal/obd"/>
   </ds:schemaRefs>
 </ds:datastoreItem>
+</file>
+
+<file path=customXml/itemProps2.xml><?xml version="1.0" encoding="utf-8"?>
+<ds:datastoreItem xmlns:ds="http://schemas.openxmlformats.org/officeDocument/2006/customXml" ds:itemID="{A75EC8C0-5113-4EFD-AE80-6BEE7563151B}">
+  <ds:schemaRefs>
+    <ds:schemaRef ds:uri="7a019f6c-b0e0-4e4c-a8bf-0404b70041b7"/>
+    <ds:schemaRef ds:uri="3a44955a-9611-4e11-b394-5c7f996d2a5e"/>
+    <ds:schemaRef ds:uri="http://schemas.microsoft.com/office/2006/metadata/properties"/>
+    <ds:schemaRef ds:uri="http://www.w3.org/XML/1998/namespace"/>
+    <ds:schemaRef ds:uri="http://schemas.microsoft.com/office/infopath/2007/PartnerControls"/>
+    <ds:schemaRef ds:uri="http://purl.org/dc/terms/"/>
+    <ds:schemaRef ds:uri="http://schemas.openxmlformats.org/package/2006/metadata/core-properties"/>
+    <ds:schemaRef ds:uri="http://schemas.microsoft.com/office/2006/documentManagement/types"/>
+    <ds:schemaRef ds:uri="http://purl.org/dc/dcmitype/"/>
+    <ds:schemaRef ds:uri="http://purl.org/dc/elements/1.1/"/>
+  </ds:schemaRefs>
+</ds:datastoreItem>
+</file>
+
+<file path=customXml/itemProps3.xml><?xml version="1.0" encoding="utf-8"?>
+<ds:datastoreItem xmlns:ds="http://schemas.openxmlformats.org/officeDocument/2006/customXml" ds:itemID="{B9505F6C-6655-4394-A390-5D0FFB49AEA6}">
+  <ds:schemaRefs>
+    <ds:schemaRef ds:uri="http://schemas.microsoft.com/sharepoint/v3/contenttype/forms"/>
+  </ds:schemaRefs>
+</ds:datastoreItem>
 </file>
</xml_diff>